<commit_message>
Made lots of sample adjustments with various light settings. Determined that color of light and intensity of light affect overall brightness
</commit_message>
<xml_diff>
--- a/demo.pptx
+++ b/demo.pptx
@@ -104,6 +104,11 @@
       </a:defRPr>
     </a:lvl9pPr>
   </p:defaultTextStyle>
+  <p:extLst>
+    <p:ext uri="{EFAFB233-063F-42B5-8137-9DF3F51BA10A}">
+      <p15:sldGuideLst xmlns:p15="http://schemas.microsoft.com/office/powerpoint/2012/main"/>
+    </p:ext>
+  </p:extLst>
 </p:presentation>
 </file>
 
@@ -254,7 +259,7 @@
           <a:p>
             <a:fld id="{458861C5-5480-9849-9B46-97FD0ACB24B4}" type="datetimeFigureOut">
               <a:rPr lang="en-US" smtClean="0"/>
-              <a:t>6/25/24</a:t>
+              <a:t>6/26/24</a:t>
             </a:fld>
             <a:endParaRPr lang="en-US"/>
           </a:p>
@@ -452,7 +457,7 @@
           <a:p>
             <a:fld id="{458861C5-5480-9849-9B46-97FD0ACB24B4}" type="datetimeFigureOut">
               <a:rPr lang="en-US" smtClean="0"/>
-              <a:t>6/25/24</a:t>
+              <a:t>6/26/24</a:t>
             </a:fld>
             <a:endParaRPr lang="en-US"/>
           </a:p>
@@ -660,7 +665,7 @@
           <a:p>
             <a:fld id="{458861C5-5480-9849-9B46-97FD0ACB24B4}" type="datetimeFigureOut">
               <a:rPr lang="en-US" smtClean="0"/>
-              <a:t>6/25/24</a:t>
+              <a:t>6/26/24</a:t>
             </a:fld>
             <a:endParaRPr lang="en-US"/>
           </a:p>
@@ -858,7 +863,7 @@
           <a:p>
             <a:fld id="{458861C5-5480-9849-9B46-97FD0ACB24B4}" type="datetimeFigureOut">
               <a:rPr lang="en-US" smtClean="0"/>
-              <a:t>6/25/24</a:t>
+              <a:t>6/26/24</a:t>
             </a:fld>
             <a:endParaRPr lang="en-US"/>
           </a:p>
@@ -1133,7 +1138,7 @@
           <a:p>
             <a:fld id="{458861C5-5480-9849-9B46-97FD0ACB24B4}" type="datetimeFigureOut">
               <a:rPr lang="en-US" smtClean="0"/>
-              <a:t>6/25/24</a:t>
+              <a:t>6/26/24</a:t>
             </a:fld>
             <a:endParaRPr lang="en-US"/>
           </a:p>
@@ -1398,7 +1403,7 @@
           <a:p>
             <a:fld id="{458861C5-5480-9849-9B46-97FD0ACB24B4}" type="datetimeFigureOut">
               <a:rPr lang="en-US" smtClean="0"/>
-              <a:t>6/25/24</a:t>
+              <a:t>6/26/24</a:t>
             </a:fld>
             <a:endParaRPr lang="en-US"/>
           </a:p>
@@ -1810,7 +1815,7 @@
           <a:p>
             <a:fld id="{458861C5-5480-9849-9B46-97FD0ACB24B4}" type="datetimeFigureOut">
               <a:rPr lang="en-US" smtClean="0"/>
-              <a:t>6/25/24</a:t>
+              <a:t>6/26/24</a:t>
             </a:fld>
             <a:endParaRPr lang="en-US"/>
           </a:p>
@@ -1951,7 +1956,7 @@
           <a:p>
             <a:fld id="{458861C5-5480-9849-9B46-97FD0ACB24B4}" type="datetimeFigureOut">
               <a:rPr lang="en-US" smtClean="0"/>
-              <a:t>6/25/24</a:t>
+              <a:t>6/26/24</a:t>
             </a:fld>
             <a:endParaRPr lang="en-US"/>
           </a:p>
@@ -2064,7 +2069,7 @@
           <a:p>
             <a:fld id="{458861C5-5480-9849-9B46-97FD0ACB24B4}" type="datetimeFigureOut">
               <a:rPr lang="en-US" smtClean="0"/>
-              <a:t>6/25/24</a:t>
+              <a:t>6/26/24</a:t>
             </a:fld>
             <a:endParaRPr lang="en-US"/>
           </a:p>
@@ -2375,7 +2380,7 @@
           <a:p>
             <a:fld id="{458861C5-5480-9849-9B46-97FD0ACB24B4}" type="datetimeFigureOut">
               <a:rPr lang="en-US" smtClean="0"/>
-              <a:t>6/25/24</a:t>
+              <a:t>6/26/24</a:t>
             </a:fld>
             <a:endParaRPr lang="en-US"/>
           </a:p>
@@ -2663,7 +2668,7 @@
           <a:p>
             <a:fld id="{458861C5-5480-9849-9B46-97FD0ACB24B4}" type="datetimeFigureOut">
               <a:rPr lang="en-US" smtClean="0"/>
-              <a:t>6/25/24</a:t>
+              <a:t>6/26/24</a:t>
             </a:fld>
             <a:endParaRPr lang="en-US"/>
           </a:p>
@@ -2904,7 +2909,7 @@
           <a:p>
             <a:fld id="{458861C5-5480-9849-9B46-97FD0ACB24B4}" type="datetimeFigureOut">
               <a:rPr lang="en-US" smtClean="0"/>
-              <a:t>6/25/24</a:t>
+              <a:t>6/26/24</a:t>
             </a:fld>
             <a:endParaRPr lang="en-US"/>
           </a:p>
@@ -3338,13 +3343,13 @@
               <p:nvPr>
                 <p:extLst>
                   <p:ext uri="{D42A27DB-BD31-4B8C-83A1-F6EECF244321}">
-                    <p14:modId xmlns:p14="http://schemas.microsoft.com/office/powerpoint/2010/main" val="3649289214"/>
+                    <p14:modId xmlns:p14="http://schemas.microsoft.com/office/powerpoint/2010/main" val="3475550206"/>
                   </p:ext>
                 </p:extLst>
               </p:nvPr>
             </p:nvGraphicFramePr>
             <p:xfrm>
-              <a:off x="2175674" y="1158001"/>
+              <a:off x="835246" y="492982"/>
               <a:ext cx="7840651" cy="4541996"/>
             </p:xfrm>
             <a:graphic>
@@ -3435,7 +3440,131 @@
             </p:blipFill>
             <p:spPr>
               <a:xfrm>
-                <a:off x="2175674" y="1158001"/>
+                <a:off x="835246" y="492982"/>
+                <a:ext cx="7840651" cy="4541996"/>
+              </a:xfrm>
+              <a:prstGeom prst="rect">
+                <a:avLst/>
+              </a:prstGeom>
+            </p:spPr>
+          </p:pic>
+        </mc:Fallback>
+      </mc:AlternateContent>
+      <mc:AlternateContent xmlns:mc="http://schemas.openxmlformats.org/markup-compatibility/2006">
+        <mc:Choice xmlns:am3d="http://schemas.microsoft.com/office/drawing/2017/model3d" Requires="am3d">
+          <p:graphicFrame>
+            <p:nvGraphicFramePr>
+              <p:cNvPr id="2" name="3D Model 1">
+                <a:extLst>
+                  <a:ext uri="{FF2B5EF4-FFF2-40B4-BE49-F238E27FC236}">
+                    <a16:creationId xmlns:a16="http://schemas.microsoft.com/office/drawing/2014/main" id="{4A537A3F-D240-A8C7-AB2C-0BA5978DDB6B}"/>
+                  </a:ext>
+                </a:extLst>
+              </p:cNvPr>
+              <p:cNvGraphicFramePr>
+                <a:graphicFrameLocks noChangeAspect="1"/>
+              </p:cNvGraphicFramePr>
+              <p:nvPr>
+                <p:extLst>
+                  <p:ext uri="{D42A27DB-BD31-4B8C-83A1-F6EECF244321}">
+                    <p14:modId xmlns:p14="http://schemas.microsoft.com/office/powerpoint/2010/main" val="2356032766"/>
+                  </p:ext>
+                </p:extLst>
+              </p:nvPr>
+            </p:nvGraphicFramePr>
+            <p:xfrm>
+              <a:off x="4936192" y="1158002"/>
+              <a:ext cx="7840651" cy="4541996"/>
+            </p:xfrm>
+            <a:graphic>
+              <a:graphicData uri="http://schemas.microsoft.com/office/drawing/2017/model3d">
+                <am3d:model3d r:embed="rId2">
+                  <am3d:spPr>
+                    <a:xfrm>
+                      <a:off x="0" y="0"/>
+                      <a:ext cx="7840651" cy="4541996"/>
+                    </a:xfrm>
+                    <a:prstGeom prst="rect">
+                      <a:avLst/>
+                    </a:prstGeom>
+                  </am3d:spPr>
+                  <am3d:camera>
+                    <am3d:pos x="0" y="0" z="63230987"/>
+                    <am3d:up dx="0" dy="36000000" dz="0"/>
+                    <am3d:lookAt x="0" y="0" z="0"/>
+                    <am3d:perspective fov="2700000"/>
+                  </am3d:camera>
+                  <am3d:trans>
+                    <am3d:meterPerModelUnit n="260671" d="1000000"/>
+                    <am3d:preTrans dx="-83933589" dy="16294444" dz="5795494"/>
+                    <am3d:scale>
+                      <am3d:sx n="1000000" d="1000000"/>
+                      <am3d:sy n="1000000" d="1000000"/>
+                      <am3d:sz n="1000000" d="1000000"/>
+                    </am3d:scale>
+                    <am3d:rot ax="1421481" ay="-2008538" az="-816339"/>
+                    <am3d:postTrans dx="0" dy="0" dz="0"/>
+                  </am3d:trans>
+                  <am3d:raster rName="Office3DRenderer" rVer="16.0.8326">
+                    <am3d:blip r:embed="rId3"/>
+                  </am3d:raster>
+                  <am3d:objViewport viewportSz="9616850"/>
+                  <am3d:ambientLight>
+                    <am3d:clr>
+                      <a:scrgbClr r="50000" g="50000" b="50000"/>
+                    </am3d:clr>
+                    <am3d:illuminance n="500000" d="1000000"/>
+                  </am3d:ambientLight>
+                  <am3d:ptLight rad="0">
+                    <am3d:clr>
+                      <a:scrgbClr r="100000" g="75000" b="50000"/>
+                    </am3d:clr>
+                    <am3d:intensity n="9765625" d="1000000"/>
+                    <am3d:pos x="21959998" y="70920001" z="16344003"/>
+                  </am3d:ptLight>
+                  <am3d:ptLight rad="0">
+                    <am3d:clr>
+                      <a:scrgbClr r="40000" g="60000" b="95000"/>
+                    </am3d:clr>
+                    <am3d:intensity n="12250000" d="1000000"/>
+                    <am3d:pos x="-37964106" y="51130435" z="57631972"/>
+                  </am3d:ptLight>
+                  <am3d:ptLight rad="0">
+                    <am3d:clr>
+                      <a:scrgbClr r="86837" g="72700" b="100000"/>
+                    </am3d:clr>
+                    <am3d:intensity n="3125000" d="1000000"/>
+                    <am3d:pos x="-37739122" y="58056624" z="-34769649"/>
+                  </am3d:ptLight>
+                </am3d:model3d>
+              </a:graphicData>
+            </a:graphic>
+          </p:graphicFrame>
+        </mc:Choice>
+        <mc:Fallback>
+          <p:pic>
+            <p:nvPicPr>
+              <p:cNvPr id="2" name="3D Model 1">
+                <a:extLst>
+                  <a:ext uri="{FF2B5EF4-FFF2-40B4-BE49-F238E27FC236}">
+                    <a16:creationId xmlns:a16="http://schemas.microsoft.com/office/drawing/2014/main" id="{4A537A3F-D240-A8C7-AB2C-0BA5978DDB6B}"/>
+                  </a:ext>
+                </a:extLst>
+              </p:cNvPr>
+              <p:cNvPicPr>
+                <a:picLocks noGrp="1" noRot="1" noChangeAspect="1" noMove="1" noResize="1" noEditPoints="1" noAdjustHandles="1" noChangeArrowheads="1" noChangeShapeType="1" noCrop="1"/>
+              </p:cNvPicPr>
+              <p:nvPr/>
+            </p:nvPicPr>
+            <p:blipFill>
+              <a:blip r:embed="rId3"/>
+              <a:stretch>
+                <a:fillRect/>
+              </a:stretch>
+            </p:blipFill>
+            <p:spPr>
+              <a:xfrm>
+                <a:off x="4936192" y="1158002"/>
                 <a:ext cx="7840651" cy="4541996"/>
               </a:xfrm>
               <a:prstGeom prst="rect">

</xml_diff>